<commit_message>
Update to ppt presentation
</commit_message>
<xml_diff>
--- a/src/JPeNS_Presentation.pptx
+++ b/src/JPeNS_Presentation.pptx
@@ -381,7 +381,7 @@
           <a:lstStyle/>
           <a:p>
             <a:pPr algn="ctr" eaLnBrk="1" latinLnBrk="0" hangingPunct="1"/>
-            <a:endParaRPr kumimoji="0" lang="en-US"/>
+            <a:endParaRPr kumimoji="0" lang="en-US" dirty="0"/>
           </a:p>
         </p:txBody>
       </p:sp>
@@ -402,9 +402,9 @@
           <a:p>
             <a:fld id="{DBE87E32-EAB1-466E-96FF-E88AF3478657}" type="datetimeFigureOut">
               <a:rPr lang="en-US" smtClean="0"/>
-              <a:t>3/29/2012</a:t>
+              <a:t>4/5/2012</a:t>
             </a:fld>
-            <a:endParaRPr lang="en-US"/>
+            <a:endParaRPr lang="en-US" dirty="0"/>
           </a:p>
         </p:txBody>
       </p:sp>
@@ -427,7 +427,7 @@
               <a:rPr lang="en-US" smtClean="0"/>
               <a:t>‹#›</a:t>
             </a:fld>
-            <a:endParaRPr lang="en-US"/>
+            <a:endParaRPr lang="en-US" dirty="0"/>
           </a:p>
         </p:txBody>
       </p:sp>
@@ -446,7 +446,7 @@
           <a:bodyPr/>
           <a:lstStyle/>
           <a:p>
-            <a:endParaRPr lang="en-US"/>
+            <a:endParaRPr lang="en-US" dirty="0"/>
           </a:p>
         </p:txBody>
       </p:sp>
@@ -567,9 +567,9 @@
           <a:p>
             <a:fld id="{DBE87E32-EAB1-466E-96FF-E88AF3478657}" type="datetimeFigureOut">
               <a:rPr lang="en-US" smtClean="0"/>
-              <a:t>3/29/2012</a:t>
+              <a:t>4/5/2012</a:t>
             </a:fld>
-            <a:endParaRPr lang="en-US"/>
+            <a:endParaRPr lang="en-US" dirty="0"/>
           </a:p>
         </p:txBody>
       </p:sp>
@@ -588,7 +588,7 @@
           <a:bodyPr/>
           <a:lstStyle/>
           <a:p>
-            <a:endParaRPr lang="en-US"/>
+            <a:endParaRPr lang="en-US" dirty="0"/>
           </a:p>
         </p:txBody>
       </p:sp>
@@ -611,7 +611,7 @@
               <a:rPr lang="en-US" smtClean="0"/>
               <a:t>‹#›</a:t>
             </a:fld>
-            <a:endParaRPr lang="en-US"/>
+            <a:endParaRPr lang="en-US" dirty="0"/>
           </a:p>
         </p:txBody>
       </p:sp>
@@ -742,9 +742,9 @@
           <a:p>
             <a:fld id="{DBE87E32-EAB1-466E-96FF-E88AF3478657}" type="datetimeFigureOut">
               <a:rPr lang="en-US" smtClean="0"/>
-              <a:t>3/29/2012</a:t>
+              <a:t>4/5/2012</a:t>
             </a:fld>
-            <a:endParaRPr lang="en-US"/>
+            <a:endParaRPr lang="en-US" dirty="0"/>
           </a:p>
         </p:txBody>
       </p:sp>
@@ -763,7 +763,7 @@
           <a:bodyPr/>
           <a:lstStyle/>
           <a:p>
-            <a:endParaRPr lang="en-US"/>
+            <a:endParaRPr lang="en-US" dirty="0"/>
           </a:p>
         </p:txBody>
       </p:sp>
@@ -786,7 +786,7 @@
               <a:rPr lang="en-US" smtClean="0"/>
               <a:t>‹#›</a:t>
             </a:fld>
-            <a:endParaRPr lang="en-US"/>
+            <a:endParaRPr lang="en-US" dirty="0"/>
           </a:p>
         </p:txBody>
       </p:sp>
@@ -889,9 +889,9 @@
           <a:p>
             <a:fld id="{DBE87E32-EAB1-466E-96FF-E88AF3478657}" type="datetimeFigureOut">
               <a:rPr lang="en-US" smtClean="0"/>
-              <a:t>3/29/2012</a:t>
+              <a:t>4/5/2012</a:t>
             </a:fld>
-            <a:endParaRPr lang="en-US"/>
+            <a:endParaRPr lang="en-US" dirty="0"/>
           </a:p>
         </p:txBody>
       </p:sp>
@@ -918,7 +918,7 @@
               <a:rPr lang="en-US" smtClean="0"/>
               <a:t>‹#›</a:t>
             </a:fld>
-            <a:endParaRPr lang="en-US"/>
+            <a:endParaRPr lang="en-US" dirty="0"/>
           </a:p>
         </p:txBody>
       </p:sp>
@@ -937,7 +937,7 @@
           <a:bodyPr/>
           <a:lstStyle/>
           <a:p>
-            <a:endParaRPr lang="en-US"/>
+            <a:endParaRPr lang="en-US" dirty="0"/>
           </a:p>
         </p:txBody>
       </p:sp>
@@ -1006,9 +1006,9 @@
           <a:p>
             <a:fld id="{DBE87E32-EAB1-466E-96FF-E88AF3478657}" type="datetimeFigureOut">
               <a:rPr lang="en-US" smtClean="0"/>
-              <a:t>3/29/2012</a:t>
+              <a:t>4/5/2012</a:t>
             </a:fld>
-            <a:endParaRPr lang="en-US"/>
+            <a:endParaRPr lang="en-US" dirty="0"/>
           </a:p>
         </p:txBody>
       </p:sp>
@@ -1027,7 +1027,7 @@
           <a:bodyPr/>
           <a:lstStyle/>
           <a:p>
-            <a:endParaRPr lang="en-US"/>
+            <a:endParaRPr lang="en-US" dirty="0"/>
           </a:p>
         </p:txBody>
       </p:sp>
@@ -1050,7 +1050,7 @@
               <a:rPr lang="en-US" smtClean="0"/>
               <a:t>‹#›</a:t>
             </a:fld>
-            <a:endParaRPr lang="en-US"/>
+            <a:endParaRPr lang="en-US" dirty="0"/>
           </a:p>
         </p:txBody>
       </p:sp>
@@ -1276,9 +1276,9 @@
           <a:p>
             <a:fld id="{DBE87E32-EAB1-466E-96FF-E88AF3478657}" type="datetimeFigureOut">
               <a:rPr lang="en-US" smtClean="0"/>
-              <a:t>3/29/2012</a:t>
+              <a:t>4/5/2012</a:t>
             </a:fld>
-            <a:endParaRPr lang="en-US"/>
+            <a:endParaRPr lang="en-US" dirty="0"/>
           </a:p>
         </p:txBody>
       </p:sp>
@@ -1297,7 +1297,7 @@
           <a:bodyPr/>
           <a:lstStyle/>
           <a:p>
-            <a:endParaRPr lang="en-US"/>
+            <a:endParaRPr lang="en-US" dirty="0"/>
           </a:p>
         </p:txBody>
       </p:sp>
@@ -1320,7 +1320,7 @@
               <a:rPr lang="en-US" smtClean="0"/>
               <a:t>‹#›</a:t>
             </a:fld>
-            <a:endParaRPr lang="en-US"/>
+            <a:endParaRPr lang="en-US" dirty="0"/>
           </a:p>
         </p:txBody>
       </p:sp>
@@ -1505,7 +1505,7 @@
               <a:rPr lang="en-US" smtClean="0"/>
               <a:t>‹#›</a:t>
             </a:fld>
-            <a:endParaRPr lang="en-US"/>
+            <a:endParaRPr lang="en-US" dirty="0"/>
           </a:p>
         </p:txBody>
       </p:sp>
@@ -1524,7 +1524,7 @@
           <a:bodyPr/>
           <a:lstStyle/>
           <a:p>
-            <a:endParaRPr lang="en-US"/>
+            <a:endParaRPr lang="en-US" dirty="0"/>
           </a:p>
         </p:txBody>
       </p:sp>
@@ -1545,9 +1545,9 @@
           <a:p>
             <a:fld id="{DBE87E32-EAB1-466E-96FF-E88AF3478657}" type="datetimeFigureOut">
               <a:rPr lang="en-US" smtClean="0"/>
-              <a:t>3/29/2012</a:t>
+              <a:t>4/5/2012</a:t>
             </a:fld>
-            <a:endParaRPr lang="en-US"/>
+            <a:endParaRPr lang="en-US" dirty="0"/>
           </a:p>
         </p:txBody>
       </p:sp>
@@ -1992,9 +1992,9 @@
           <a:p>
             <a:fld id="{DBE87E32-EAB1-466E-96FF-E88AF3478657}" type="datetimeFigureOut">
               <a:rPr lang="en-US" smtClean="0"/>
-              <a:t>3/29/2012</a:t>
+              <a:t>4/5/2012</a:t>
             </a:fld>
-            <a:endParaRPr lang="en-US"/>
+            <a:endParaRPr lang="en-US" dirty="0"/>
           </a:p>
         </p:txBody>
       </p:sp>
@@ -2013,7 +2013,7 @@
           <a:bodyPr/>
           <a:lstStyle/>
           <a:p>
-            <a:endParaRPr lang="en-US"/>
+            <a:endParaRPr lang="en-US" dirty="0"/>
           </a:p>
         </p:txBody>
       </p:sp>
@@ -2036,7 +2036,7 @@
               <a:rPr lang="en-US" smtClean="0"/>
               <a:t>‹#›</a:t>
             </a:fld>
-            <a:endParaRPr lang="en-US"/>
+            <a:endParaRPr lang="en-US" dirty="0"/>
           </a:p>
         </p:txBody>
       </p:sp>
@@ -2105,9 +2105,9 @@
           <a:p>
             <a:fld id="{DBE87E32-EAB1-466E-96FF-E88AF3478657}" type="datetimeFigureOut">
               <a:rPr lang="en-US" smtClean="0"/>
-              <a:t>3/29/2012</a:t>
+              <a:t>4/5/2012</a:t>
             </a:fld>
-            <a:endParaRPr lang="en-US"/>
+            <a:endParaRPr lang="en-US" dirty="0"/>
           </a:p>
         </p:txBody>
       </p:sp>
@@ -2126,7 +2126,7 @@
           <a:bodyPr/>
           <a:lstStyle/>
           <a:p>
-            <a:endParaRPr lang="en-US"/>
+            <a:endParaRPr lang="en-US" dirty="0"/>
           </a:p>
         </p:txBody>
       </p:sp>
@@ -2149,7 +2149,7 @@
               <a:rPr lang="en-US" smtClean="0"/>
               <a:t>‹#›</a:t>
             </a:fld>
-            <a:endParaRPr lang="en-US"/>
+            <a:endParaRPr lang="en-US" dirty="0"/>
           </a:p>
         </p:txBody>
       </p:sp>
@@ -2355,9 +2355,9 @@
           <a:p>
             <a:fld id="{DBE87E32-EAB1-466E-96FF-E88AF3478657}" type="datetimeFigureOut">
               <a:rPr lang="en-US" smtClean="0"/>
-              <a:t>3/29/2012</a:t>
+              <a:t>4/5/2012</a:t>
             </a:fld>
-            <a:endParaRPr lang="en-US"/>
+            <a:endParaRPr lang="en-US" dirty="0"/>
           </a:p>
         </p:txBody>
       </p:sp>
@@ -2380,7 +2380,7 @@
               <a:rPr lang="en-US" smtClean="0"/>
               <a:t>‹#›</a:t>
             </a:fld>
-            <a:endParaRPr lang="en-US"/>
+            <a:endParaRPr lang="en-US" dirty="0"/>
           </a:p>
         </p:txBody>
       </p:sp>
@@ -2399,7 +2399,7 @@
           <a:bodyPr/>
           <a:lstStyle/>
           <a:p>
-            <a:endParaRPr lang="en-US"/>
+            <a:endParaRPr lang="en-US" dirty="0"/>
           </a:p>
         </p:txBody>
       </p:sp>
@@ -2515,10 +2515,10 @@
           </a:lstStyle>
           <a:p>
             <a:r>
-              <a:rPr kumimoji="0" lang="en-US" smtClean="0"/>
+              <a:rPr kumimoji="0" lang="en-US" dirty="0" smtClean="0"/>
               <a:t>Click icon to add picture</a:t>
             </a:r>
-            <a:endParaRPr kumimoji="0" lang="en-US"/>
+            <a:endParaRPr kumimoji="0" lang="en-US" dirty="0"/>
           </a:p>
         </p:txBody>
       </p:sp>
@@ -2595,9 +2595,9 @@
           <a:p>
             <a:fld id="{DBE87E32-EAB1-466E-96FF-E88AF3478657}" type="datetimeFigureOut">
               <a:rPr lang="en-US" smtClean="0"/>
-              <a:t>3/29/2012</a:t>
+              <a:t>4/5/2012</a:t>
             </a:fld>
-            <a:endParaRPr lang="en-US"/>
+            <a:endParaRPr lang="en-US" dirty="0"/>
           </a:p>
         </p:txBody>
       </p:sp>
@@ -2620,7 +2620,7 @@
               <a:rPr lang="en-US" smtClean="0"/>
               <a:t>‹#›</a:t>
             </a:fld>
-            <a:endParaRPr lang="en-US"/>
+            <a:endParaRPr lang="en-US" dirty="0"/>
           </a:p>
         </p:txBody>
       </p:sp>
@@ -2639,7 +2639,7 @@
           <a:bodyPr/>
           <a:lstStyle/>
           <a:p>
-            <a:endParaRPr lang="en-US"/>
+            <a:endParaRPr lang="en-US" dirty="0"/>
           </a:p>
         </p:txBody>
       </p:sp>
@@ -2768,9 +2768,9 @@
           <a:p>
             <a:fld id="{DBE87E32-EAB1-466E-96FF-E88AF3478657}" type="datetimeFigureOut">
               <a:rPr lang="en-US" smtClean="0"/>
-              <a:t>3/29/2012</a:t>
+              <a:t>4/5/2012</a:t>
             </a:fld>
-            <a:endParaRPr lang="en-US"/>
+            <a:endParaRPr lang="en-US" dirty="0"/>
           </a:p>
         </p:txBody>
       </p:sp>
@@ -2805,7 +2805,7 @@
             </a:lvl1pPr>
           </a:lstStyle>
           <a:p>
-            <a:endParaRPr lang="en-US"/>
+            <a:endParaRPr lang="en-US" dirty="0"/>
           </a:p>
         </p:txBody>
       </p:sp>
@@ -2847,7 +2847,7 @@
               <a:rPr lang="en-US" smtClean="0"/>
               <a:t>‹#›</a:t>
             </a:fld>
-            <a:endParaRPr lang="en-US"/>
+            <a:endParaRPr lang="en-US" dirty="0"/>
           </a:p>
         </p:txBody>
       </p:sp>
@@ -3306,7 +3306,15 @@
           <a:p>
             <a:r>
               <a:rPr lang="en-US" dirty="0" smtClean="0"/>
-              <a:t>Java Petri-Net Simulator</a:t>
+              <a:t>Java </a:t>
+            </a:r>
+            <a:r>
+              <a:rPr lang="en-US" dirty="0" smtClean="0"/>
+              <a:t>Petri Network </a:t>
+            </a:r>
+            <a:r>
+              <a:rPr lang="en-US" dirty="0" smtClean="0"/>
+              <a:t>Simulator</a:t>
             </a:r>
             <a:br>
               <a:rPr lang="en-US" dirty="0" smtClean="0"/>
@@ -3316,7 +3324,7 @@
               <a:t>(</a:t>
             </a:r>
             <a:r>
-              <a:rPr lang="en-US" dirty="0" err="1" smtClean="0"/>
+              <a:rPr lang="en-US" dirty="0" smtClean="0"/>
               <a:t>JPeNS</a:t>
             </a:r>
             <a:r>
@@ -3433,7 +3441,7 @@
               <a:t> </a:t>
             </a:r>
             <a:r>
-              <a:rPr lang="en-US" dirty="0" err="1" smtClean="0"/>
+              <a:rPr lang="en-US" dirty="0" smtClean="0"/>
               <a:t>JPeNS</a:t>
             </a:r>
             <a:r>
@@ -3493,17 +3501,39 @@
         </p:nvSpPr>
         <p:spPr/>
         <p:txBody>
-          <a:bodyPr/>
-          <a:lstStyle/>
-          <a:p>
-            <a:pPr marL="0" indent="0">
-              <a:buNone/>
-            </a:pPr>
+          <a:bodyPr>
+            <a:normAutofit/>
+          </a:bodyPr>
+          <a:lstStyle/>
+          <a:p>
             <a:r>
               <a:rPr lang="en-US" dirty="0" smtClean="0"/>
-              <a:t>We chose to do our project on a Petri-Net simulator because we both find them to be an interesting topic. They are a great way to map out the logic of a program or circuit and how it should function. And the best part is obviously getting to draw them.</a:t>
-            </a:r>
-            <a:endParaRPr lang="en-US" dirty="0"/>
+              <a:t>They are an interesting topic</a:t>
+            </a:r>
+            <a:endParaRPr lang="en-US" dirty="0" smtClean="0"/>
+          </a:p>
+          <a:p>
+            <a:r>
+              <a:rPr lang="en-US" dirty="0" smtClean="0"/>
+              <a:t>Sometimes a difficult topic to learn for people without a computing or engineering background </a:t>
+            </a:r>
+          </a:p>
+          <a:p>
+            <a:r>
+              <a:rPr lang="en-US" dirty="0" smtClean="0"/>
+              <a:t>Could be taught at various levels of the education system given the right tools</a:t>
+            </a:r>
+          </a:p>
+          <a:p>
+            <a:r>
+              <a:rPr lang="en-US" dirty="0" smtClean="0"/>
+              <a:t>Useful for mapping a broad range of trigger </a:t>
+            </a:r>
+            <a:r>
+              <a:rPr lang="en-US" dirty="0"/>
+              <a:t>based systems </a:t>
+            </a:r>
+            <a:endParaRPr lang="en-US" dirty="0" smtClean="0"/>
           </a:p>
         </p:txBody>
       </p:sp>
@@ -3527,17 +3557,152 @@
               <a:t>Why </a:t>
             </a:r>
             <a:r>
-              <a:rPr lang="en-US" dirty="0" err="1" smtClean="0"/>
-              <a:t>JPeNS</a:t>
-            </a:r>
-            <a:r>
               <a:rPr lang="en-US" dirty="0" smtClean="0"/>
-              <a:t>?</a:t>
-            </a:r>
-            <a:endParaRPr lang="en-US" dirty="0"/>
-          </a:p>
-        </p:txBody>
-      </p:sp>
+              <a:t>We Chose Petri Networks?</a:t>
+            </a:r>
+            <a:endParaRPr lang="en-US" dirty="0"/>
+          </a:p>
+        </p:txBody>
+      </p:sp>
+      <p:graphicFrame>
+        <p:nvGraphicFramePr>
+          <p:cNvPr id="5" name="Table 4"/>
+          <p:cNvGraphicFramePr>
+            <a:graphicFrameLocks noGrp="1"/>
+          </p:cNvGraphicFramePr>
+          <p:nvPr>
+            <p:extLst>
+              <p:ext uri="{D42A27DB-BD31-4B8C-83A1-F6EECF244321}">
+                <p14:modId xmlns:p14="http://schemas.microsoft.com/office/powerpoint/2010/main" val="890361308"/>
+              </p:ext>
+            </p:extLst>
+          </p:nvPr>
+        </p:nvGraphicFramePr>
+        <p:xfrm>
+          <a:off x="-152400" y="4724400"/>
+          <a:ext cx="8686800" cy="1188720"/>
+        </p:xfrm>
+        <a:graphic>
+          <a:graphicData uri="http://schemas.openxmlformats.org/drawingml/2006/table">
+            <a:tbl>
+              <a:tblPr>
+                <a:tableStyleId>{2D5ABB26-0587-4C30-8999-92F81FD0307C}</a:tableStyleId>
+              </a:tblPr>
+              <a:tblGrid>
+                <a:gridCol w="4267200"/>
+                <a:gridCol w="4419600"/>
+              </a:tblGrid>
+              <a:tr h="939800">
+                <a:tc>
+                  <a:txBody>
+                    <a:bodyPr/>
+                    <a:lstStyle/>
+                    <a:p>
+                      <a:pPr marL="1657350" lvl="3" indent="-285750">
+                        <a:buFont typeface="Arial" pitchFamily="34" charset="0"/>
+                        <a:buChar char="•"/>
+                      </a:pPr>
+                      <a:r>
+                        <a:rPr lang="en-US" dirty="0" smtClean="0"/>
+                        <a:t>Software design</a:t>
+                      </a:r>
+                    </a:p>
+                    <a:p>
+                      <a:pPr marL="1657350" lvl="3" indent="-285750">
+                        <a:buFont typeface="Arial" pitchFamily="34" charset="0"/>
+                        <a:buChar char="•"/>
+                      </a:pPr>
+                      <a:r>
+                        <a:rPr lang="en-US" dirty="0" smtClean="0"/>
+                        <a:t>Workflow management </a:t>
+                      </a:r>
+                    </a:p>
+                    <a:p>
+                      <a:pPr marL="1657350" lvl="3" indent="-285750">
+                        <a:buFont typeface="Arial" pitchFamily="34" charset="0"/>
+                        <a:buChar char="•"/>
+                      </a:pPr>
+                      <a:r>
+                        <a:rPr lang="en-US" dirty="0" smtClean="0"/>
+                        <a:t>Process Modeling </a:t>
+                      </a:r>
+                    </a:p>
+                    <a:p>
+                      <a:endParaRPr lang="en-US" dirty="0"/>
+                    </a:p>
+                  </a:txBody>
+                  <a:tcPr>
+                    <a:lnL>
+                      <a:noFill/>
+                    </a:lnL>
+                    <a:lnR>
+                      <a:noFill/>
+                    </a:lnR>
+                    <a:lnT>
+                      <a:noFill/>
+                    </a:lnT>
+                    <a:lnB>
+                      <a:noFill/>
+                    </a:lnB>
+                    <a:lnTlToBr w="12700" cmpd="sng">
+                      <a:noFill/>
+                      <a:prstDash val="solid"/>
+                    </a:lnTlToBr>
+                    <a:lnBlToTr w="12700" cmpd="sng">
+                      <a:noFill/>
+                      <a:prstDash val="solid"/>
+                    </a:lnBlToTr>
+                  </a:tcPr>
+                </a:tc>
+                <a:tc>
+                  <a:txBody>
+                    <a:bodyPr/>
+                    <a:lstStyle/>
+                    <a:p>
+                      <a:pPr marL="1657350" lvl="3" indent="-285750">
+                        <a:buFont typeface="Arial" pitchFamily="34" charset="0"/>
+                        <a:buChar char="•"/>
+                      </a:pPr>
+                      <a:r>
+                        <a:rPr lang="en-US" dirty="0" smtClean="0"/>
+                        <a:t>Data analysis </a:t>
+                      </a:r>
+                    </a:p>
+                    <a:p>
+                      <a:pPr marL="1657350" lvl="3" indent="-285750">
+                        <a:buFont typeface="Arial" pitchFamily="34" charset="0"/>
+                        <a:buChar char="•"/>
+                      </a:pPr>
+                      <a:r>
+                        <a:rPr lang="en-US" dirty="0" smtClean="0"/>
+                        <a:t>Diagnosis</a:t>
+                      </a:r>
+                    </a:p>
+                    <a:p>
+                      <a:pPr marL="1657350" lvl="3" indent="-285750">
+                        <a:buFont typeface="Arial" pitchFamily="34" charset="0"/>
+                        <a:buChar char="•"/>
+                      </a:pPr>
+                      <a:r>
+                        <a:rPr lang="en-US" dirty="0" smtClean="0"/>
+                        <a:t>Simulation</a:t>
+                      </a:r>
+                    </a:p>
+                    <a:p>
+                      <a:endParaRPr lang="en-US" dirty="0"/>
+                    </a:p>
+                  </a:txBody>
+                  <a:tcPr>
+                    <a:lnL>
+                      <a:noFill/>
+                    </a:lnL>
+                  </a:tcPr>
+                </a:tc>
+              </a:tr>
+            </a:tbl>
+          </a:graphicData>
+        </a:graphic>
+      </p:graphicFrame>
     </p:spTree>
     <p:extLst>
       <p:ext uri="{BB962C8B-B14F-4D97-AF65-F5344CB8AC3E}">
@@ -3590,7 +3755,7 @@
           <a:bodyPr/>
           <a:lstStyle/>
           <a:p>
-            <a:endParaRPr lang="en-US"/>
+            <a:endParaRPr lang="en-US" dirty="0"/>
           </a:p>
         </p:txBody>
       </p:sp>
@@ -3610,7 +3775,7 @@
           <a:lstStyle/>
           <a:p>
             <a:r>
-              <a:rPr lang="en-US" dirty="0" err="1" smtClean="0"/>
+              <a:rPr lang="en-US" dirty="0" smtClean="0"/>
               <a:t>JPeNS</a:t>
             </a:r>
             <a:r>
@@ -3704,6 +3869,70 @@
           </a:p>
         </p:txBody>
       </p:sp>
+      <p:pic>
+        <p:nvPicPr>
+          <p:cNvPr id="2053" name="Picture 5"/>
+          <p:cNvPicPr>
+            <a:picLocks noChangeAspect="1" noChangeArrowheads="1"/>
+          </p:cNvPicPr>
+          <p:nvPr/>
+        </p:nvPicPr>
+        <p:blipFill>
+          <a:blip r:embed="rId2">
+            <a:extLst>
+              <a:ext uri="{28A0092B-C50C-407E-A947-70E740481C1C}">
+                <a14:useLocalDpi xmlns:a14="http://schemas.microsoft.com/office/drawing/2010/main" val="0"/>
+              </a:ext>
+            </a:extLst>
+          </a:blip>
+          <a:srcRect/>
+          <a:stretch>
+            <a:fillRect/>
+          </a:stretch>
+        </p:blipFill>
+        <p:spPr bwMode="auto">
+          <a:xfrm>
+            <a:off x="762000" y="1905000"/>
+            <a:ext cx="7429500" cy="3935557"/>
+          </a:xfrm>
+          <a:prstGeom prst="rect">
+            <a:avLst/>
+          </a:prstGeom>
+          <a:noFill/>
+          <a:ln>
+            <a:noFill/>
+          </a:ln>
+          <a:effectLst/>
+          <a:extLst>
+            <a:ext uri="{909E8E84-426E-40DD-AFC4-6F175D3DCCD1}">
+              <a14:hiddenFill xmlns:a14="http://schemas.microsoft.com/office/drawing/2010/main">
+                <a:solidFill>
+                  <a:schemeClr val="accent1"/>
+                </a:solidFill>
+              </a14:hiddenFill>
+            </a:ext>
+            <a:ext uri="{91240B29-F687-4F45-9708-019B960494DF}">
+              <a14:hiddenLine xmlns:a14="http://schemas.microsoft.com/office/drawing/2010/main" w="9525">
+                <a:solidFill>
+                  <a:schemeClr val="tx1"/>
+                </a:solidFill>
+                <a:miter lim="800000"/>
+                <a:headEnd/>
+                <a:tailEnd/>
+              </a14:hiddenLine>
+            </a:ext>
+            <a:ext uri="{AF507438-7753-43E0-B8FC-AC1667EBCBE1}">
+              <a14:hiddenEffects xmlns:a14="http://schemas.microsoft.com/office/drawing/2010/main">
+                <a:effectLst>
+                  <a:outerShdw dist="35921" dir="2700000" algn="ctr" rotWithShape="0">
+                    <a:schemeClr val="bg2"/>
+                  </a:outerShdw>
+                </a:effectLst>
+              </a14:hiddenEffects>
+            </a:ext>
+          </a:extLst>
+        </p:spPr>
+      </p:pic>
     </p:spTree>
     <p:extLst>
       <p:ext uri="{BB962C8B-B14F-4D97-AF65-F5344CB8AC3E}">

</xml_diff>